<commit_message>
Add sequence diagram for context changing
Update sequence diagram for deleting entry.
</commit_message>
<xml_diff>
--- a/docs/diagrams/DeletePersonSdForLogic.pptx
+++ b/docs/diagrams/DeletePersonSdForLogic.pptx
@@ -208,7 +208,7 @@
           <a:p>
             <a:fld id="{F5CC4B3F-88C1-4FFA-B1B6-F41C21DC6924}" type="datetimeFigureOut">
               <a:rPr lang="en-US" smtClean="0"/>
-              <a:t>4/2/2019</a:t>
+              <a:t>4/9/2019</a:t>
             </a:fld>
             <a:endParaRPr lang="en-US"/>
           </a:p>
@@ -738,7 +738,7 @@
           <a:p>
             <a:fld id="{78C97017-6FC3-485B-9764-EAC9E56C1D49}" type="datetimeFigureOut">
               <a:rPr lang="en-US" smtClean="0"/>
-              <a:t>4/2/2019</a:t>
+              <a:t>4/9/2019</a:t>
             </a:fld>
             <a:endParaRPr lang="en-US"/>
           </a:p>
@@ -906,7 +906,7 @@
           <a:p>
             <a:fld id="{78C97017-6FC3-485B-9764-EAC9E56C1D49}" type="datetimeFigureOut">
               <a:rPr lang="en-US" smtClean="0"/>
-              <a:t>4/2/2019</a:t>
+              <a:t>4/9/2019</a:t>
             </a:fld>
             <a:endParaRPr lang="en-US"/>
           </a:p>
@@ -1084,7 +1084,7 @@
           <a:p>
             <a:fld id="{78C97017-6FC3-485B-9764-EAC9E56C1D49}" type="datetimeFigureOut">
               <a:rPr lang="en-US" smtClean="0"/>
-              <a:t>4/2/2019</a:t>
+              <a:t>4/9/2019</a:t>
             </a:fld>
             <a:endParaRPr lang="en-US"/>
           </a:p>
@@ -1252,7 +1252,7 @@
           <a:p>
             <a:fld id="{78C97017-6FC3-485B-9764-EAC9E56C1D49}" type="datetimeFigureOut">
               <a:rPr lang="en-US" smtClean="0"/>
-              <a:t>4/2/2019</a:t>
+              <a:t>4/9/2019</a:t>
             </a:fld>
             <a:endParaRPr lang="en-US"/>
           </a:p>
@@ -1497,7 +1497,7 @@
           <a:p>
             <a:fld id="{78C97017-6FC3-485B-9764-EAC9E56C1D49}" type="datetimeFigureOut">
               <a:rPr lang="en-US" smtClean="0"/>
-              <a:t>4/2/2019</a:t>
+              <a:t>4/9/2019</a:t>
             </a:fld>
             <a:endParaRPr lang="en-US"/>
           </a:p>
@@ -1782,7 +1782,7 @@
           <a:p>
             <a:fld id="{78C97017-6FC3-485B-9764-EAC9E56C1D49}" type="datetimeFigureOut">
               <a:rPr lang="en-US" smtClean="0"/>
-              <a:t>4/2/2019</a:t>
+              <a:t>4/9/2019</a:t>
             </a:fld>
             <a:endParaRPr lang="en-US"/>
           </a:p>
@@ -2201,7 +2201,7 @@
           <a:p>
             <a:fld id="{78C97017-6FC3-485B-9764-EAC9E56C1D49}" type="datetimeFigureOut">
               <a:rPr lang="en-US" smtClean="0"/>
-              <a:t>4/2/2019</a:t>
+              <a:t>4/9/2019</a:t>
             </a:fld>
             <a:endParaRPr lang="en-US"/>
           </a:p>
@@ -2318,7 +2318,7 @@
           <a:p>
             <a:fld id="{78C97017-6FC3-485B-9764-EAC9E56C1D49}" type="datetimeFigureOut">
               <a:rPr lang="en-US" smtClean="0"/>
-              <a:t>4/2/2019</a:t>
+              <a:t>4/9/2019</a:t>
             </a:fld>
             <a:endParaRPr lang="en-US"/>
           </a:p>
@@ -2413,7 +2413,7 @@
           <a:p>
             <a:fld id="{78C97017-6FC3-485B-9764-EAC9E56C1D49}" type="datetimeFigureOut">
               <a:rPr lang="en-US" smtClean="0"/>
-              <a:t>4/2/2019</a:t>
+              <a:t>4/9/2019</a:t>
             </a:fld>
             <a:endParaRPr lang="en-US"/>
           </a:p>
@@ -2688,7 +2688,7 @@
           <a:p>
             <a:fld id="{78C97017-6FC3-485B-9764-EAC9E56C1D49}" type="datetimeFigureOut">
               <a:rPr lang="en-US" smtClean="0"/>
-              <a:t>4/2/2019</a:t>
+              <a:t>4/9/2019</a:t>
             </a:fld>
             <a:endParaRPr lang="en-US"/>
           </a:p>
@@ -2940,7 +2940,7 @@
           <a:p>
             <a:fld id="{78C97017-6FC3-485B-9764-EAC9E56C1D49}" type="datetimeFigureOut">
               <a:rPr lang="en-US" smtClean="0"/>
-              <a:t>4/2/2019</a:t>
+              <a:t>4/9/2019</a:t>
             </a:fld>
             <a:endParaRPr lang="en-US"/>
           </a:p>
@@ -3151,7 +3151,7 @@
           <a:p>
             <a:fld id="{78C97017-6FC3-485B-9764-EAC9E56C1D49}" type="datetimeFigureOut">
               <a:rPr lang="en-US" smtClean="0"/>
-              <a:t>4/2/2019</a:t>
+              <a:t>4/9/2019</a:t>
             </a:fld>
             <a:endParaRPr lang="en-US"/>
           </a:p>
@@ -3960,9 +3960,9 @@
           <p:nvPr/>
         </p:nvCxnSpPr>
         <p:spPr>
-          <a:xfrm>
-            <a:off x="1373943" y="1489760"/>
-            <a:ext cx="0" cy="2855075"/>
+          <a:xfrm flipH="1">
+            <a:off x="1367046" y="1489760"/>
+            <a:ext cx="6897" cy="3033919"/>
           </a:xfrm>
           <a:prstGeom prst="line">
             <a:avLst/>
@@ -4010,7 +4010,7 @@
         <p:spPr>
           <a:xfrm>
             <a:off x="2685103" y="1489760"/>
-            <a:ext cx="1545" cy="1749820"/>
+            <a:ext cx="0" cy="3033919"/>
           </a:xfrm>
           <a:prstGeom prst="line">
             <a:avLst/>

</xml_diff>